<commit_message>
v2.0.0 last commit of code and deliverables
</commit_message>
<xml_diff>
--- a/deliverables/presentatie/Mobdev II - CoinSaver.pptx
+++ b/deliverables/presentatie/Mobdev II - CoinSaver.pptx
@@ -16,6 +16,13 @@
     <p:sldId id="263" r:id="rId10"/>
     <p:sldId id="264" r:id="rId11"/>
     <p:sldId id="266" r:id="rId12"/>
+    <p:sldId id="267" r:id="rId13"/>
+    <p:sldId id="268" r:id="rId14"/>
+    <p:sldId id="269" r:id="rId15"/>
+    <p:sldId id="270" r:id="rId16"/>
+    <p:sldId id="271" r:id="rId17"/>
+    <p:sldId id="272" r:id="rId18"/>
+    <p:sldId id="273" r:id="rId19"/>
   </p:sldIdLst>
   <p:sldSz cx="12192000" cy="6858000"/>
   <p:notesSz cx="6858000" cy="9144000"/>
@@ -114,6 +121,11 @@
       </a:defRPr>
     </a:lvl9pPr>
   </p:defaultTextStyle>
+  <p:extLst>
+    <p:ext uri="{EFAFB233-063F-42B5-8137-9DF3F51BA10A}">
+      <p15:sldGuideLst xmlns:p15="http://schemas.microsoft.com/office/powerpoint/2012/main"/>
+    </p:ext>
+  </p:extLst>
 </p:presentation>
 </file>
 
@@ -6354,6 +6366,765 @@
 </p:sld>
 </file>
 
+<file path=ppt/slides/slide12.xml><?xml version="1.0" encoding="utf-8"?>
+<p:sld xmlns:a="http://schemas.openxmlformats.org/drawingml/2006/main" xmlns:r="http://schemas.openxmlformats.org/officeDocument/2006/relationships" xmlns:p="http://schemas.openxmlformats.org/presentationml/2006/main">
+  <p:cSld>
+    <p:spTree>
+      <p:nvGrpSpPr>
+        <p:cNvPr id="1" name=""/>
+        <p:cNvGrpSpPr/>
+        <p:nvPr/>
+      </p:nvGrpSpPr>
+      <p:grpSpPr>
+        <a:xfrm>
+          <a:off x="0" y="0"/>
+          <a:ext cx="0" cy="0"/>
+          <a:chOff x="0" y="0"/>
+          <a:chExt cx="0" cy="0"/>
+        </a:xfrm>
+      </p:grpSpPr>
+      <p:sp>
+        <p:nvSpPr>
+          <p:cNvPr id="2" name="Title 1">
+            <a:extLst>
+              <a:ext uri="{FF2B5EF4-FFF2-40B4-BE49-F238E27FC236}">
+                <a16:creationId xmlns:a16="http://schemas.microsoft.com/office/drawing/2014/main" id="{907B3198-E5DC-4766-8169-F74CAADE0C57}"/>
+              </a:ext>
+            </a:extLst>
+          </p:cNvPr>
+          <p:cNvSpPr>
+            <a:spLocks noGrp="1"/>
+          </p:cNvSpPr>
+          <p:nvPr>
+            <p:ph type="title"/>
+          </p:nvPr>
+        </p:nvSpPr>
+        <p:spPr/>
+        <p:txBody>
+          <a:bodyPr/>
+          <a:lstStyle/>
+          <a:p>
+            <a:r>
+              <a:rPr lang="nl-NL" dirty="0"/>
+              <a:t>De Code: enkele voorbeelden</a:t>
+            </a:r>
+          </a:p>
+        </p:txBody>
+      </p:sp>
+      <p:pic>
+        <p:nvPicPr>
+          <p:cNvPr id="6" name="Content Placeholder 5">
+            <a:extLst>
+              <a:ext uri="{FF2B5EF4-FFF2-40B4-BE49-F238E27FC236}">
+                <a16:creationId xmlns:a16="http://schemas.microsoft.com/office/drawing/2014/main" id="{7CABE008-2579-481D-BF9F-48A46ADD1AD1}"/>
+              </a:ext>
+            </a:extLst>
+          </p:cNvPr>
+          <p:cNvPicPr>
+            <a:picLocks noGrp="1" noChangeAspect="1"/>
+          </p:cNvPicPr>
+          <p:nvPr>
+            <p:ph idx="1"/>
+          </p:nvPr>
+        </p:nvPicPr>
+        <p:blipFill>
+          <a:blip r:embed="rId2"/>
+          <a:stretch>
+            <a:fillRect/>
+          </a:stretch>
+        </p:blipFill>
+        <p:spPr>
+          <a:xfrm>
+            <a:off x="10505283" y="452718"/>
+            <a:ext cx="579113" cy="579113"/>
+          </a:xfrm>
+        </p:spPr>
+      </p:pic>
+      <p:pic>
+        <p:nvPicPr>
+          <p:cNvPr id="3" name="Picture 2">
+            <a:extLst>
+              <a:ext uri="{FF2B5EF4-FFF2-40B4-BE49-F238E27FC236}">
+                <a16:creationId xmlns:a16="http://schemas.microsoft.com/office/drawing/2014/main" id="{340DCDD1-D568-4276-A654-23E0A4688A1D}"/>
+              </a:ext>
+            </a:extLst>
+          </p:cNvPr>
+          <p:cNvPicPr>
+            <a:picLocks noChangeAspect="1"/>
+          </p:cNvPicPr>
+          <p:nvPr/>
+        </p:nvPicPr>
+        <p:blipFill>
+          <a:blip r:embed="rId3"/>
+          <a:stretch>
+            <a:fillRect/>
+          </a:stretch>
+        </p:blipFill>
+        <p:spPr>
+          <a:xfrm>
+            <a:off x="303629" y="1920099"/>
+            <a:ext cx="5176331" cy="3017801"/>
+          </a:xfrm>
+          <a:prstGeom prst="rect">
+            <a:avLst/>
+          </a:prstGeom>
+        </p:spPr>
+      </p:pic>
+      <p:pic>
+        <p:nvPicPr>
+          <p:cNvPr id="5" name="Picture 4">
+            <a:extLst>
+              <a:ext uri="{FF2B5EF4-FFF2-40B4-BE49-F238E27FC236}">
+                <a16:creationId xmlns:a16="http://schemas.microsoft.com/office/drawing/2014/main" id="{0D36DE2F-1824-40EE-B58F-BC53D3B9B249}"/>
+              </a:ext>
+            </a:extLst>
+          </p:cNvPr>
+          <p:cNvPicPr>
+            <a:picLocks noChangeAspect="1"/>
+          </p:cNvPicPr>
+          <p:nvPr/>
+        </p:nvPicPr>
+        <p:blipFill>
+          <a:blip r:embed="rId4"/>
+          <a:stretch>
+            <a:fillRect/>
+          </a:stretch>
+        </p:blipFill>
+        <p:spPr>
+          <a:xfrm>
+            <a:off x="6096000" y="1920099"/>
+            <a:ext cx="5083105" cy="3733389"/>
+          </a:xfrm>
+          <a:prstGeom prst="rect">
+            <a:avLst/>
+          </a:prstGeom>
+        </p:spPr>
+      </p:pic>
+    </p:spTree>
+    <p:extLst>
+      <p:ext uri="{BB962C8B-B14F-4D97-AF65-F5344CB8AC3E}">
+        <p14:creationId xmlns:p14="http://schemas.microsoft.com/office/powerpoint/2010/main" val="456784914"/>
+      </p:ext>
+    </p:extLst>
+  </p:cSld>
+  <p:clrMapOvr>
+    <a:masterClrMapping/>
+  </p:clrMapOvr>
+</p:sld>
+</file>
+
+<file path=ppt/slides/slide13.xml><?xml version="1.0" encoding="utf-8"?>
+<p:sld xmlns:a="http://schemas.openxmlformats.org/drawingml/2006/main" xmlns:r="http://schemas.openxmlformats.org/officeDocument/2006/relationships" xmlns:p="http://schemas.openxmlformats.org/presentationml/2006/main">
+  <p:cSld>
+    <p:spTree>
+      <p:nvGrpSpPr>
+        <p:cNvPr id="1" name=""/>
+        <p:cNvGrpSpPr/>
+        <p:nvPr/>
+      </p:nvGrpSpPr>
+      <p:grpSpPr>
+        <a:xfrm>
+          <a:off x="0" y="0"/>
+          <a:ext cx="0" cy="0"/>
+          <a:chOff x="0" y="0"/>
+          <a:chExt cx="0" cy="0"/>
+        </a:xfrm>
+      </p:grpSpPr>
+      <p:sp>
+        <p:nvSpPr>
+          <p:cNvPr id="2" name="Title 1">
+            <a:extLst>
+              <a:ext uri="{FF2B5EF4-FFF2-40B4-BE49-F238E27FC236}">
+                <a16:creationId xmlns:a16="http://schemas.microsoft.com/office/drawing/2014/main" id="{907B3198-E5DC-4766-8169-F74CAADE0C57}"/>
+              </a:ext>
+            </a:extLst>
+          </p:cNvPr>
+          <p:cNvSpPr>
+            <a:spLocks noGrp="1"/>
+          </p:cNvSpPr>
+          <p:nvPr>
+            <p:ph type="title"/>
+          </p:nvPr>
+        </p:nvSpPr>
+        <p:spPr/>
+        <p:txBody>
+          <a:bodyPr/>
+          <a:lstStyle/>
+          <a:p>
+            <a:r>
+              <a:rPr lang="nl-NL" dirty="0"/>
+              <a:t>De Code: enkele voorbeelden</a:t>
+            </a:r>
+          </a:p>
+        </p:txBody>
+      </p:sp>
+      <p:pic>
+        <p:nvPicPr>
+          <p:cNvPr id="6" name="Content Placeholder 5">
+            <a:extLst>
+              <a:ext uri="{FF2B5EF4-FFF2-40B4-BE49-F238E27FC236}">
+                <a16:creationId xmlns:a16="http://schemas.microsoft.com/office/drawing/2014/main" id="{7CABE008-2579-481D-BF9F-48A46ADD1AD1}"/>
+              </a:ext>
+            </a:extLst>
+          </p:cNvPr>
+          <p:cNvPicPr>
+            <a:picLocks noGrp="1" noChangeAspect="1"/>
+          </p:cNvPicPr>
+          <p:nvPr>
+            <p:ph idx="1"/>
+          </p:nvPr>
+        </p:nvPicPr>
+        <p:blipFill>
+          <a:blip r:embed="rId2"/>
+          <a:stretch>
+            <a:fillRect/>
+          </a:stretch>
+        </p:blipFill>
+        <p:spPr>
+          <a:xfrm>
+            <a:off x="10505283" y="452718"/>
+            <a:ext cx="579113" cy="579113"/>
+          </a:xfrm>
+        </p:spPr>
+      </p:pic>
+      <p:pic>
+        <p:nvPicPr>
+          <p:cNvPr id="4" name="Picture 3">
+            <a:extLst>
+              <a:ext uri="{FF2B5EF4-FFF2-40B4-BE49-F238E27FC236}">
+                <a16:creationId xmlns:a16="http://schemas.microsoft.com/office/drawing/2014/main" id="{64EC8F0B-F1B9-4E9B-8F14-B6F71B0FF44A}"/>
+              </a:ext>
+            </a:extLst>
+          </p:cNvPr>
+          <p:cNvPicPr>
+            <a:picLocks noChangeAspect="1"/>
+          </p:cNvPicPr>
+          <p:nvPr/>
+        </p:nvPicPr>
+        <p:blipFill>
+          <a:blip r:embed="rId3"/>
+          <a:stretch>
+            <a:fillRect/>
+          </a:stretch>
+        </p:blipFill>
+        <p:spPr>
+          <a:xfrm>
+            <a:off x="956396" y="1673546"/>
+            <a:ext cx="8784152" cy="4456666"/>
+          </a:xfrm>
+          <a:prstGeom prst="rect">
+            <a:avLst/>
+          </a:prstGeom>
+        </p:spPr>
+      </p:pic>
+    </p:spTree>
+    <p:extLst>
+      <p:ext uri="{BB962C8B-B14F-4D97-AF65-F5344CB8AC3E}">
+        <p14:creationId xmlns:p14="http://schemas.microsoft.com/office/powerpoint/2010/main" val="422388392"/>
+      </p:ext>
+    </p:extLst>
+  </p:cSld>
+  <p:clrMapOvr>
+    <a:masterClrMapping/>
+  </p:clrMapOvr>
+</p:sld>
+</file>
+
+<file path=ppt/slides/slide14.xml><?xml version="1.0" encoding="utf-8"?>
+<p:sld xmlns:a="http://schemas.openxmlformats.org/drawingml/2006/main" xmlns:r="http://schemas.openxmlformats.org/officeDocument/2006/relationships" xmlns:p="http://schemas.openxmlformats.org/presentationml/2006/main">
+  <p:cSld>
+    <p:spTree>
+      <p:nvGrpSpPr>
+        <p:cNvPr id="1" name=""/>
+        <p:cNvGrpSpPr/>
+        <p:nvPr/>
+      </p:nvGrpSpPr>
+      <p:grpSpPr>
+        <a:xfrm>
+          <a:off x="0" y="0"/>
+          <a:ext cx="0" cy="0"/>
+          <a:chOff x="0" y="0"/>
+          <a:chExt cx="0" cy="0"/>
+        </a:xfrm>
+      </p:grpSpPr>
+      <p:sp>
+        <p:nvSpPr>
+          <p:cNvPr id="2" name="Title 1">
+            <a:extLst>
+              <a:ext uri="{FF2B5EF4-FFF2-40B4-BE49-F238E27FC236}">
+                <a16:creationId xmlns:a16="http://schemas.microsoft.com/office/drawing/2014/main" id="{907B3198-E5DC-4766-8169-F74CAADE0C57}"/>
+              </a:ext>
+            </a:extLst>
+          </p:cNvPr>
+          <p:cNvSpPr>
+            <a:spLocks noGrp="1"/>
+          </p:cNvSpPr>
+          <p:nvPr>
+            <p:ph type="title"/>
+          </p:nvPr>
+        </p:nvSpPr>
+        <p:spPr/>
+        <p:txBody>
+          <a:bodyPr/>
+          <a:lstStyle/>
+          <a:p>
+            <a:r>
+              <a:rPr lang="nl-NL" dirty="0"/>
+              <a:t>De Code: enkele voorbeelden</a:t>
+            </a:r>
+          </a:p>
+        </p:txBody>
+      </p:sp>
+      <p:pic>
+        <p:nvPicPr>
+          <p:cNvPr id="6" name="Content Placeholder 5">
+            <a:extLst>
+              <a:ext uri="{FF2B5EF4-FFF2-40B4-BE49-F238E27FC236}">
+                <a16:creationId xmlns:a16="http://schemas.microsoft.com/office/drawing/2014/main" id="{7CABE008-2579-481D-BF9F-48A46ADD1AD1}"/>
+              </a:ext>
+            </a:extLst>
+          </p:cNvPr>
+          <p:cNvPicPr>
+            <a:picLocks noGrp="1" noChangeAspect="1"/>
+          </p:cNvPicPr>
+          <p:nvPr>
+            <p:ph idx="1"/>
+          </p:nvPr>
+        </p:nvPicPr>
+        <p:blipFill>
+          <a:blip r:embed="rId2"/>
+          <a:stretch>
+            <a:fillRect/>
+          </a:stretch>
+        </p:blipFill>
+        <p:spPr>
+          <a:xfrm>
+            <a:off x="10505283" y="452718"/>
+            <a:ext cx="579113" cy="579113"/>
+          </a:xfrm>
+        </p:spPr>
+      </p:pic>
+      <p:pic>
+        <p:nvPicPr>
+          <p:cNvPr id="7" name="Picture 6">
+            <a:extLst>
+              <a:ext uri="{FF2B5EF4-FFF2-40B4-BE49-F238E27FC236}">
+                <a16:creationId xmlns:a16="http://schemas.microsoft.com/office/drawing/2014/main" id="{875C9E78-C97F-4375-865B-5237E3DA4DB4}"/>
+              </a:ext>
+            </a:extLst>
+          </p:cNvPr>
+          <p:cNvPicPr>
+            <a:picLocks noChangeAspect="1"/>
+          </p:cNvPicPr>
+          <p:nvPr/>
+        </p:nvPicPr>
+        <p:blipFill>
+          <a:blip r:embed="rId3"/>
+          <a:stretch>
+            <a:fillRect/>
+          </a:stretch>
+        </p:blipFill>
+        <p:spPr>
+          <a:xfrm>
+            <a:off x="1439416" y="1348402"/>
+            <a:ext cx="7657931" cy="5211018"/>
+          </a:xfrm>
+          <a:prstGeom prst="rect">
+            <a:avLst/>
+          </a:prstGeom>
+        </p:spPr>
+      </p:pic>
+    </p:spTree>
+    <p:extLst>
+      <p:ext uri="{BB962C8B-B14F-4D97-AF65-F5344CB8AC3E}">
+        <p14:creationId xmlns:p14="http://schemas.microsoft.com/office/powerpoint/2010/main" val="1905194622"/>
+      </p:ext>
+    </p:extLst>
+  </p:cSld>
+  <p:clrMapOvr>
+    <a:masterClrMapping/>
+  </p:clrMapOvr>
+</p:sld>
+</file>
+
+<file path=ppt/slides/slide15.xml><?xml version="1.0" encoding="utf-8"?>
+<p:sld xmlns:a="http://schemas.openxmlformats.org/drawingml/2006/main" xmlns:r="http://schemas.openxmlformats.org/officeDocument/2006/relationships" xmlns:p="http://schemas.openxmlformats.org/presentationml/2006/main">
+  <p:cSld>
+    <p:spTree>
+      <p:nvGrpSpPr>
+        <p:cNvPr id="1" name=""/>
+        <p:cNvGrpSpPr/>
+        <p:nvPr/>
+      </p:nvGrpSpPr>
+      <p:grpSpPr>
+        <a:xfrm>
+          <a:off x="0" y="0"/>
+          <a:ext cx="0" cy="0"/>
+          <a:chOff x="0" y="0"/>
+          <a:chExt cx="0" cy="0"/>
+        </a:xfrm>
+      </p:grpSpPr>
+      <p:sp>
+        <p:nvSpPr>
+          <p:cNvPr id="2" name="Title 1">
+            <a:extLst>
+              <a:ext uri="{FF2B5EF4-FFF2-40B4-BE49-F238E27FC236}">
+                <a16:creationId xmlns:a16="http://schemas.microsoft.com/office/drawing/2014/main" id="{907B3198-E5DC-4766-8169-F74CAADE0C57}"/>
+              </a:ext>
+            </a:extLst>
+          </p:cNvPr>
+          <p:cNvSpPr>
+            <a:spLocks noGrp="1"/>
+          </p:cNvSpPr>
+          <p:nvPr>
+            <p:ph type="title"/>
+          </p:nvPr>
+        </p:nvSpPr>
+        <p:spPr/>
+        <p:txBody>
+          <a:bodyPr/>
+          <a:lstStyle/>
+          <a:p>
+            <a:r>
+              <a:rPr lang="nl-NL" dirty="0"/>
+              <a:t>De Code: enkele voorbeelden</a:t>
+            </a:r>
+          </a:p>
+        </p:txBody>
+      </p:sp>
+      <p:pic>
+        <p:nvPicPr>
+          <p:cNvPr id="6" name="Content Placeholder 5">
+            <a:extLst>
+              <a:ext uri="{FF2B5EF4-FFF2-40B4-BE49-F238E27FC236}">
+                <a16:creationId xmlns:a16="http://schemas.microsoft.com/office/drawing/2014/main" id="{7CABE008-2579-481D-BF9F-48A46ADD1AD1}"/>
+              </a:ext>
+            </a:extLst>
+          </p:cNvPr>
+          <p:cNvPicPr>
+            <a:picLocks noGrp="1" noChangeAspect="1"/>
+          </p:cNvPicPr>
+          <p:nvPr>
+            <p:ph idx="1"/>
+          </p:nvPr>
+        </p:nvPicPr>
+        <p:blipFill>
+          <a:blip r:embed="rId2"/>
+          <a:stretch>
+            <a:fillRect/>
+          </a:stretch>
+        </p:blipFill>
+        <p:spPr>
+          <a:xfrm>
+            <a:off x="10505283" y="452718"/>
+            <a:ext cx="579113" cy="579113"/>
+          </a:xfrm>
+        </p:spPr>
+      </p:pic>
+      <p:pic>
+        <p:nvPicPr>
+          <p:cNvPr id="3" name="Picture 2">
+            <a:extLst>
+              <a:ext uri="{FF2B5EF4-FFF2-40B4-BE49-F238E27FC236}">
+                <a16:creationId xmlns:a16="http://schemas.microsoft.com/office/drawing/2014/main" id="{9F70AF6E-8310-45F3-BA46-4404B2C7C8FE}"/>
+              </a:ext>
+            </a:extLst>
+          </p:cNvPr>
+          <p:cNvPicPr>
+            <a:picLocks noChangeAspect="1"/>
+          </p:cNvPicPr>
+          <p:nvPr/>
+        </p:nvPicPr>
+        <p:blipFill>
+          <a:blip r:embed="rId3"/>
+          <a:stretch>
+            <a:fillRect/>
+          </a:stretch>
+        </p:blipFill>
+        <p:spPr>
+          <a:xfrm>
+            <a:off x="821094" y="1345948"/>
+            <a:ext cx="10050834" cy="5059334"/>
+          </a:xfrm>
+          <a:prstGeom prst="rect">
+            <a:avLst/>
+          </a:prstGeom>
+        </p:spPr>
+      </p:pic>
+    </p:spTree>
+    <p:extLst>
+      <p:ext uri="{BB962C8B-B14F-4D97-AF65-F5344CB8AC3E}">
+        <p14:creationId xmlns:p14="http://schemas.microsoft.com/office/powerpoint/2010/main" val="3859047049"/>
+      </p:ext>
+    </p:extLst>
+  </p:cSld>
+  <p:clrMapOvr>
+    <a:masterClrMapping/>
+  </p:clrMapOvr>
+</p:sld>
+</file>
+
+<file path=ppt/slides/slide16.xml><?xml version="1.0" encoding="utf-8"?>
+<p:sld xmlns:a="http://schemas.openxmlformats.org/drawingml/2006/main" xmlns:r="http://schemas.openxmlformats.org/officeDocument/2006/relationships" xmlns:p="http://schemas.openxmlformats.org/presentationml/2006/main">
+  <p:cSld>
+    <p:spTree>
+      <p:nvGrpSpPr>
+        <p:cNvPr id="1" name=""/>
+        <p:cNvGrpSpPr/>
+        <p:nvPr/>
+      </p:nvGrpSpPr>
+      <p:grpSpPr>
+        <a:xfrm>
+          <a:off x="0" y="0"/>
+          <a:ext cx="0" cy="0"/>
+          <a:chOff x="0" y="0"/>
+          <a:chExt cx="0" cy="0"/>
+        </a:xfrm>
+      </p:grpSpPr>
+      <p:sp>
+        <p:nvSpPr>
+          <p:cNvPr id="2" name="Title 1">
+            <a:extLst>
+              <a:ext uri="{FF2B5EF4-FFF2-40B4-BE49-F238E27FC236}">
+                <a16:creationId xmlns:a16="http://schemas.microsoft.com/office/drawing/2014/main" id="{907B3198-E5DC-4766-8169-F74CAADE0C57}"/>
+              </a:ext>
+            </a:extLst>
+          </p:cNvPr>
+          <p:cNvSpPr>
+            <a:spLocks noGrp="1"/>
+          </p:cNvSpPr>
+          <p:nvPr>
+            <p:ph type="title"/>
+          </p:nvPr>
+        </p:nvSpPr>
+        <p:spPr/>
+        <p:txBody>
+          <a:bodyPr/>
+          <a:lstStyle/>
+          <a:p>
+            <a:r>
+              <a:rPr lang="nl-NL" dirty="0"/>
+              <a:t>De uitijndelijke webapp</a:t>
+            </a:r>
+          </a:p>
+        </p:txBody>
+      </p:sp>
+      <p:pic>
+        <p:nvPicPr>
+          <p:cNvPr id="6" name="Content Placeholder 5">
+            <a:extLst>
+              <a:ext uri="{FF2B5EF4-FFF2-40B4-BE49-F238E27FC236}">
+                <a16:creationId xmlns:a16="http://schemas.microsoft.com/office/drawing/2014/main" id="{7CABE008-2579-481D-BF9F-48A46ADD1AD1}"/>
+              </a:ext>
+            </a:extLst>
+          </p:cNvPr>
+          <p:cNvPicPr>
+            <a:picLocks noGrp="1" noChangeAspect="1"/>
+          </p:cNvPicPr>
+          <p:nvPr>
+            <p:ph idx="1"/>
+          </p:nvPr>
+        </p:nvPicPr>
+        <p:blipFill>
+          <a:blip r:embed="rId2"/>
+          <a:stretch>
+            <a:fillRect/>
+          </a:stretch>
+        </p:blipFill>
+        <p:spPr>
+          <a:xfrm>
+            <a:off x="10505283" y="452718"/>
+            <a:ext cx="579113" cy="579113"/>
+          </a:xfrm>
+        </p:spPr>
+      </p:pic>
+    </p:spTree>
+    <p:extLst>
+      <p:ext uri="{BB962C8B-B14F-4D97-AF65-F5344CB8AC3E}">
+        <p14:creationId xmlns:p14="http://schemas.microsoft.com/office/powerpoint/2010/main" val="2702137696"/>
+      </p:ext>
+    </p:extLst>
+  </p:cSld>
+  <p:clrMapOvr>
+    <a:masterClrMapping/>
+  </p:clrMapOvr>
+</p:sld>
+</file>
+
+<file path=ppt/slides/slide17.xml><?xml version="1.0" encoding="utf-8"?>
+<p:sld xmlns:a="http://schemas.openxmlformats.org/drawingml/2006/main" xmlns:r="http://schemas.openxmlformats.org/officeDocument/2006/relationships" xmlns:p="http://schemas.openxmlformats.org/presentationml/2006/main">
+  <p:cSld>
+    <p:spTree>
+      <p:nvGrpSpPr>
+        <p:cNvPr id="1" name=""/>
+        <p:cNvGrpSpPr/>
+        <p:nvPr/>
+      </p:nvGrpSpPr>
+      <p:grpSpPr>
+        <a:xfrm>
+          <a:off x="0" y="0"/>
+          <a:ext cx="0" cy="0"/>
+          <a:chOff x="0" y="0"/>
+          <a:chExt cx="0" cy="0"/>
+        </a:xfrm>
+      </p:grpSpPr>
+      <p:sp>
+        <p:nvSpPr>
+          <p:cNvPr id="2" name="Title 1">
+            <a:extLst>
+              <a:ext uri="{FF2B5EF4-FFF2-40B4-BE49-F238E27FC236}">
+                <a16:creationId xmlns:a16="http://schemas.microsoft.com/office/drawing/2014/main" id="{907B3198-E5DC-4766-8169-F74CAADE0C57}"/>
+              </a:ext>
+            </a:extLst>
+          </p:cNvPr>
+          <p:cNvSpPr>
+            <a:spLocks noGrp="1"/>
+          </p:cNvSpPr>
+          <p:nvPr>
+            <p:ph type="title"/>
+          </p:nvPr>
+        </p:nvSpPr>
+        <p:spPr/>
+        <p:txBody>
+          <a:bodyPr/>
+          <a:lstStyle/>
+          <a:p>
+            <a:r>
+              <a:rPr lang="nl-NL" dirty="0"/>
+              <a:t>Q &amp; A</a:t>
+            </a:r>
+          </a:p>
+        </p:txBody>
+      </p:sp>
+      <p:pic>
+        <p:nvPicPr>
+          <p:cNvPr id="6" name="Content Placeholder 5">
+            <a:extLst>
+              <a:ext uri="{FF2B5EF4-FFF2-40B4-BE49-F238E27FC236}">
+                <a16:creationId xmlns:a16="http://schemas.microsoft.com/office/drawing/2014/main" id="{7CABE008-2579-481D-BF9F-48A46ADD1AD1}"/>
+              </a:ext>
+            </a:extLst>
+          </p:cNvPr>
+          <p:cNvPicPr>
+            <a:picLocks noGrp="1" noChangeAspect="1"/>
+          </p:cNvPicPr>
+          <p:nvPr>
+            <p:ph idx="1"/>
+          </p:nvPr>
+        </p:nvPicPr>
+        <p:blipFill>
+          <a:blip r:embed="rId2"/>
+          <a:stretch>
+            <a:fillRect/>
+          </a:stretch>
+        </p:blipFill>
+        <p:spPr>
+          <a:xfrm>
+            <a:off x="10505283" y="452718"/>
+            <a:ext cx="579113" cy="579113"/>
+          </a:xfrm>
+        </p:spPr>
+      </p:pic>
+    </p:spTree>
+    <p:extLst>
+      <p:ext uri="{BB962C8B-B14F-4D97-AF65-F5344CB8AC3E}">
+        <p14:creationId xmlns:p14="http://schemas.microsoft.com/office/powerpoint/2010/main" val="3216052784"/>
+      </p:ext>
+    </p:extLst>
+  </p:cSld>
+  <p:clrMapOvr>
+    <a:masterClrMapping/>
+  </p:clrMapOvr>
+</p:sld>
+</file>
+
+<file path=ppt/slides/slide18.xml><?xml version="1.0" encoding="utf-8"?>
+<p:sld xmlns:a="http://schemas.openxmlformats.org/drawingml/2006/main" xmlns:r="http://schemas.openxmlformats.org/officeDocument/2006/relationships" xmlns:p="http://schemas.openxmlformats.org/presentationml/2006/main">
+  <p:cSld>
+    <p:spTree>
+      <p:nvGrpSpPr>
+        <p:cNvPr id="1" name=""/>
+        <p:cNvGrpSpPr/>
+        <p:nvPr/>
+      </p:nvGrpSpPr>
+      <p:grpSpPr>
+        <a:xfrm>
+          <a:off x="0" y="0"/>
+          <a:ext cx="0" cy="0"/>
+          <a:chOff x="0" y="0"/>
+          <a:chExt cx="0" cy="0"/>
+        </a:xfrm>
+      </p:grpSpPr>
+      <p:sp>
+        <p:nvSpPr>
+          <p:cNvPr id="2" name="Title 1">
+            <a:extLst>
+              <a:ext uri="{FF2B5EF4-FFF2-40B4-BE49-F238E27FC236}">
+                <a16:creationId xmlns:a16="http://schemas.microsoft.com/office/drawing/2014/main" id="{907B3198-E5DC-4766-8169-F74CAADE0C57}"/>
+              </a:ext>
+            </a:extLst>
+          </p:cNvPr>
+          <p:cNvSpPr>
+            <a:spLocks noGrp="1"/>
+          </p:cNvSpPr>
+          <p:nvPr>
+            <p:ph type="title"/>
+          </p:nvPr>
+        </p:nvSpPr>
+        <p:spPr/>
+        <p:txBody>
+          <a:bodyPr/>
+          <a:lstStyle/>
+          <a:p>
+            <a:r>
+              <a:rPr lang="nl-NL" dirty="0"/>
+              <a:t>Bedankt </a:t>
+            </a:r>
+          </a:p>
+        </p:txBody>
+      </p:sp>
+      <p:pic>
+        <p:nvPicPr>
+          <p:cNvPr id="6" name="Content Placeholder 5">
+            <a:extLst>
+              <a:ext uri="{FF2B5EF4-FFF2-40B4-BE49-F238E27FC236}">
+                <a16:creationId xmlns:a16="http://schemas.microsoft.com/office/drawing/2014/main" id="{7CABE008-2579-481D-BF9F-48A46ADD1AD1}"/>
+              </a:ext>
+            </a:extLst>
+          </p:cNvPr>
+          <p:cNvPicPr>
+            <a:picLocks noGrp="1" noChangeAspect="1"/>
+          </p:cNvPicPr>
+          <p:nvPr>
+            <p:ph idx="1"/>
+          </p:nvPr>
+        </p:nvPicPr>
+        <p:blipFill>
+          <a:blip r:embed="rId2"/>
+          <a:stretch>
+            <a:fillRect/>
+          </a:stretch>
+        </p:blipFill>
+        <p:spPr>
+          <a:xfrm>
+            <a:off x="10505283" y="452718"/>
+            <a:ext cx="579113" cy="579113"/>
+          </a:xfrm>
+        </p:spPr>
+      </p:pic>
+    </p:spTree>
+    <p:extLst>
+      <p:ext uri="{BB962C8B-B14F-4D97-AF65-F5344CB8AC3E}">
+        <p14:creationId xmlns:p14="http://schemas.microsoft.com/office/powerpoint/2010/main" val="2791261965"/>
+      </p:ext>
+    </p:extLst>
+  </p:cSld>
+  <p:clrMapOvr>
+    <a:masterClrMapping/>
+  </p:clrMapOvr>
+</p:sld>
+</file>
+
 <file path=ppt/slides/slide2.xml><?xml version="1.0" encoding="utf-8"?>
 <p:sld xmlns:a="http://schemas.openxmlformats.org/drawingml/2006/main" xmlns:r="http://schemas.openxmlformats.org/officeDocument/2006/relationships" xmlns:p="http://schemas.openxmlformats.org/presentationml/2006/main">
   <p:cSld>
@@ -6739,7 +7510,7 @@
           <a:graphicData uri="http://schemas.openxmlformats.org/presentationml/2006/ole">
             <mc:AlternateContent xmlns:mc="http://schemas.openxmlformats.org/markup-compatibility/2006">
               <mc:Choice xmlns:v="urn:schemas-microsoft-com:vml" Requires="v">
-                <p:oleObj spid="_x0000_s1031" name="Acrobat Document" r:id="rId4" imgW="8019840" imgH="11344061" progId="Acrobat.Document.DC">
+                <p:oleObj spid="_x0000_s1033" name="Acrobat Document" r:id="rId4" imgW="8019840" imgH="11344061" progId="Acrobat.Document.DC">
                   <p:embed/>
                 </p:oleObj>
               </mc:Choice>

</xml_diff>